<commit_message>
Fixed CNR formula, difference = contrast only
</commit_message>
<xml_diff>
--- a/replicating_alexandras_plots/replicating_alexandras_plots.pptx
+++ b/replicating_alexandras_plots/replicating_alexandras_plots.pptx
@@ -262,7 +262,7 @@
           <a:p>
             <a:fld id="{E1F1015D-8E89-AB48-97AC-5E6116BCC817}" type="datetimeFigureOut">
               <a:rPr lang="en-US" smtClean="0"/>
-              <a:t>2/6/18</a:t>
+              <a:t>2/12/18</a:t>
             </a:fld>
             <a:endParaRPr lang="en-US"/>
           </a:p>
@@ -460,7 +460,7 @@
           <a:p>
             <a:fld id="{E1F1015D-8E89-AB48-97AC-5E6116BCC817}" type="datetimeFigureOut">
               <a:rPr lang="en-US" smtClean="0"/>
-              <a:t>2/6/18</a:t>
+              <a:t>2/12/18</a:t>
             </a:fld>
             <a:endParaRPr lang="en-US"/>
           </a:p>
@@ -668,7 +668,7 @@
           <a:p>
             <a:fld id="{E1F1015D-8E89-AB48-97AC-5E6116BCC817}" type="datetimeFigureOut">
               <a:rPr lang="en-US" smtClean="0"/>
-              <a:t>2/6/18</a:t>
+              <a:t>2/12/18</a:t>
             </a:fld>
             <a:endParaRPr lang="en-US"/>
           </a:p>
@@ -866,7 +866,7 @@
           <a:p>
             <a:fld id="{E1F1015D-8E89-AB48-97AC-5E6116BCC817}" type="datetimeFigureOut">
               <a:rPr lang="en-US" smtClean="0"/>
-              <a:t>2/6/18</a:t>
+              <a:t>2/12/18</a:t>
             </a:fld>
             <a:endParaRPr lang="en-US"/>
           </a:p>
@@ -1141,7 +1141,7 @@
           <a:p>
             <a:fld id="{E1F1015D-8E89-AB48-97AC-5E6116BCC817}" type="datetimeFigureOut">
               <a:rPr lang="en-US" smtClean="0"/>
-              <a:t>2/6/18</a:t>
+              <a:t>2/12/18</a:t>
             </a:fld>
             <a:endParaRPr lang="en-US"/>
           </a:p>
@@ -1406,7 +1406,7 @@
           <a:p>
             <a:fld id="{E1F1015D-8E89-AB48-97AC-5E6116BCC817}" type="datetimeFigureOut">
               <a:rPr lang="en-US" smtClean="0"/>
-              <a:t>2/6/18</a:t>
+              <a:t>2/12/18</a:t>
             </a:fld>
             <a:endParaRPr lang="en-US"/>
           </a:p>
@@ -1818,7 +1818,7 @@
           <a:p>
             <a:fld id="{E1F1015D-8E89-AB48-97AC-5E6116BCC817}" type="datetimeFigureOut">
               <a:rPr lang="en-US" smtClean="0"/>
-              <a:t>2/6/18</a:t>
+              <a:t>2/12/18</a:t>
             </a:fld>
             <a:endParaRPr lang="en-US"/>
           </a:p>
@@ -1959,7 +1959,7 @@
           <a:p>
             <a:fld id="{E1F1015D-8E89-AB48-97AC-5E6116BCC817}" type="datetimeFigureOut">
               <a:rPr lang="en-US" smtClean="0"/>
-              <a:t>2/6/18</a:t>
+              <a:t>2/12/18</a:t>
             </a:fld>
             <a:endParaRPr lang="en-US"/>
           </a:p>
@@ -2072,7 +2072,7 @@
           <a:p>
             <a:fld id="{E1F1015D-8E89-AB48-97AC-5E6116BCC817}" type="datetimeFigureOut">
               <a:rPr lang="en-US" smtClean="0"/>
-              <a:t>2/6/18</a:t>
+              <a:t>2/12/18</a:t>
             </a:fld>
             <a:endParaRPr lang="en-US"/>
           </a:p>
@@ -2383,7 +2383,7 @@
           <a:p>
             <a:fld id="{E1F1015D-8E89-AB48-97AC-5E6116BCC817}" type="datetimeFigureOut">
               <a:rPr lang="en-US" smtClean="0"/>
-              <a:t>2/6/18</a:t>
+              <a:t>2/12/18</a:t>
             </a:fld>
             <a:endParaRPr lang="en-US"/>
           </a:p>
@@ -2671,7 +2671,7 @@
           <a:p>
             <a:fld id="{E1F1015D-8E89-AB48-97AC-5E6116BCC817}" type="datetimeFigureOut">
               <a:rPr lang="en-US" smtClean="0"/>
-              <a:t>2/6/18</a:t>
+              <a:t>2/12/18</a:t>
             </a:fld>
             <a:endParaRPr lang="en-US"/>
           </a:p>
@@ -2912,7 +2912,7 @@
           <a:p>
             <a:fld id="{E1F1015D-8E89-AB48-97AC-5E6116BCC817}" type="datetimeFigureOut">
               <a:rPr lang="en-US" smtClean="0"/>
-              <a:t>2/6/18</a:t>
+              <a:t>2/12/18</a:t>
             </a:fld>
             <a:endParaRPr lang="en-US"/>
           </a:p>

</xml_diff>